<commit_message>
:speech_balloon: Update by feedback
</commit_message>
<xml_diff>
--- a/06/yongki/HashTable.pptx
+++ b/06/yongki/HashTable.pptx
@@ -5,7 +5,7 @@
     <p:sldMasterId id="2147483648" r:id="rId1"/>
   </p:sldMasterIdLst>
   <p:notesMasterIdLst>
-    <p:notesMasterId r:id="rId18"/>
+    <p:notesMasterId r:id="rId16"/>
   </p:notesMasterIdLst>
   <p:sldIdLst>
     <p:sldId id="256" r:id="rId2"/>
@@ -21,9 +21,7 @@
     <p:sldId id="334" r:id="rId12"/>
     <p:sldId id="316" r:id="rId13"/>
     <p:sldId id="331" r:id="rId14"/>
-    <p:sldId id="332" r:id="rId15"/>
-    <p:sldId id="333" r:id="rId16"/>
-    <p:sldId id="301" r:id="rId17"/>
+    <p:sldId id="301" r:id="rId15"/>
   </p:sldIdLst>
   <p:sldSz cx="9144000" cy="6858000" type="screen4x3"/>
   <p:notesSz cx="6858000" cy="9144000"/>
@@ -253,7 +251,7 @@
           <a:p>
             <a:fld id="{278A5395-7299-4714-9E5C-8983F2B9A6E7}" type="datetimeFigureOut">
               <a:rPr lang="ko-KR" altLang="en-US" smtClean="0"/>
-              <a:t>2022-03-11</a:t>
+              <a:t>2022-03-12</a:t>
             </a:fld>
             <a:endParaRPr lang="ko-KR" altLang="en-US"/>
           </a:p>
@@ -6062,1200 +6060,6 @@
         </p:nvSpPr>
         <p:spPr bwMode="auto">
           <a:xfrm>
-            <a:off x="1925737" y="2852936"/>
-            <a:ext cx="5292526" cy="647700"/>
-          </a:xfrm>
-          <a:prstGeom prst="rect">
-            <a:avLst/>
-          </a:prstGeom>
-          <a:noFill/>
-          <a:ln>
-            <a:noFill/>
-          </a:ln>
-          <a:effectLst/>
-          <a:extLst>
-            <a:ext uri="{909E8E84-426E-40DD-AFC4-6F175D3DCCD1}">
-              <a14:hiddenFill xmlns:a14="http://schemas.microsoft.com/office/drawing/2010/main">
-                <a:solidFill>
-                  <a:schemeClr val="accent1"/>
-                </a:solidFill>
-              </a14:hiddenFill>
-            </a:ext>
-            <a:ext uri="{91240B29-F687-4F45-9708-019B960494DF}">
-              <a14:hiddenLine xmlns:a14="http://schemas.microsoft.com/office/drawing/2010/main" w="9525">
-                <a:solidFill>
-                  <a:schemeClr val="tx1"/>
-                </a:solidFill>
-                <a:miter lim="800000"/>
-                <a:headEnd/>
-                <a:tailEnd/>
-              </a14:hiddenLine>
-            </a:ext>
-            <a:ext uri="{AF507438-7753-43E0-B8FC-AC1667EBCBE1}">
-              <a14:hiddenEffects xmlns:a14="http://schemas.microsoft.com/office/drawing/2010/main">
-                <a:effectLst>
-                  <a:outerShdw dist="35921" dir="2700000" algn="ctr" rotWithShape="0">
-                    <a:schemeClr val="bg2"/>
-                  </a:outerShdw>
-                </a:effectLst>
-              </a14:hiddenEffects>
-            </a:ext>
-          </a:extLst>
-        </p:spPr>
-        <p:txBody>
-          <a:bodyPr vert="horz" wrap="square" lIns="91440" tIns="45720" rIns="91440" bIns="45720" numCol="1" anchor="ctr" anchorCtr="0" compatLnSpc="1">
-            <a:prstTxWarp prst="textNoShape">
-              <a:avLst/>
-            </a:prstTxWarp>
-          </a:bodyPr>
-          <a:lstStyle>
-            <a:lvl1pPr algn="ctr" rtl="0" eaLnBrk="0" fontAlgn="base" hangingPunct="0">
-              <a:spcBef>
-                <a:spcPct val="0"/>
-              </a:spcBef>
-              <a:spcAft>
-                <a:spcPct val="0"/>
-              </a:spcAft>
-              <a:defRPr sz="4400" kern="1200">
-                <a:solidFill>
-                  <a:schemeClr val="tx2"/>
-                </a:solidFill>
-                <a:latin typeface="맑은 고딕" panose="020B0503020000020004" pitchFamily="50" charset="-127"/>
-                <a:ea typeface="맑은 고딕" panose="020B0503020000020004" pitchFamily="50" charset="-127"/>
-                <a:cs typeface="+mj-cs"/>
-              </a:defRPr>
-            </a:lvl1pPr>
-            <a:lvl2pPr algn="ctr" rtl="0" eaLnBrk="0" fontAlgn="base" hangingPunct="0">
-              <a:spcBef>
-                <a:spcPct val="0"/>
-              </a:spcBef>
-              <a:spcAft>
-                <a:spcPct val="0"/>
-              </a:spcAft>
-              <a:defRPr sz="4400">
-                <a:solidFill>
-                  <a:schemeClr val="tx2"/>
-                </a:solidFill>
-                <a:latin typeface="Arial" panose="020B0604020202020204" pitchFamily="34" charset="0"/>
-                <a:ea typeface="Arial Unicode MS" panose="020B0604020202020204" pitchFamily="50" charset="-127"/>
-                <a:cs typeface="Arial" panose="020B0604020202020204" pitchFamily="34" charset="0"/>
-              </a:defRPr>
-            </a:lvl2pPr>
-            <a:lvl3pPr algn="ctr" rtl="0" eaLnBrk="0" fontAlgn="base" hangingPunct="0">
-              <a:spcBef>
-                <a:spcPct val="0"/>
-              </a:spcBef>
-              <a:spcAft>
-                <a:spcPct val="0"/>
-              </a:spcAft>
-              <a:defRPr sz="4400">
-                <a:solidFill>
-                  <a:schemeClr val="tx2"/>
-                </a:solidFill>
-                <a:latin typeface="Arial" panose="020B0604020202020204" pitchFamily="34" charset="0"/>
-                <a:ea typeface="Arial Unicode MS" panose="020B0604020202020204" pitchFamily="50" charset="-127"/>
-                <a:cs typeface="Arial" panose="020B0604020202020204" pitchFamily="34" charset="0"/>
-              </a:defRPr>
-            </a:lvl3pPr>
-            <a:lvl4pPr algn="ctr" rtl="0" eaLnBrk="0" fontAlgn="base" hangingPunct="0">
-              <a:spcBef>
-                <a:spcPct val="0"/>
-              </a:spcBef>
-              <a:spcAft>
-                <a:spcPct val="0"/>
-              </a:spcAft>
-              <a:defRPr sz="4400">
-                <a:solidFill>
-                  <a:schemeClr val="tx2"/>
-                </a:solidFill>
-                <a:latin typeface="Arial" panose="020B0604020202020204" pitchFamily="34" charset="0"/>
-                <a:ea typeface="Arial Unicode MS" panose="020B0604020202020204" pitchFamily="50" charset="-127"/>
-                <a:cs typeface="Arial" panose="020B0604020202020204" pitchFamily="34" charset="0"/>
-              </a:defRPr>
-            </a:lvl4pPr>
-            <a:lvl5pPr algn="ctr" rtl="0" eaLnBrk="0" fontAlgn="base" hangingPunct="0">
-              <a:spcBef>
-                <a:spcPct val="0"/>
-              </a:spcBef>
-              <a:spcAft>
-                <a:spcPct val="0"/>
-              </a:spcAft>
-              <a:defRPr sz="4400">
-                <a:solidFill>
-                  <a:schemeClr val="tx2"/>
-                </a:solidFill>
-                <a:latin typeface="Arial" panose="020B0604020202020204" pitchFamily="34" charset="0"/>
-                <a:ea typeface="Arial Unicode MS" panose="020B0604020202020204" pitchFamily="50" charset="-127"/>
-                <a:cs typeface="Arial" panose="020B0604020202020204" pitchFamily="34" charset="0"/>
-              </a:defRPr>
-            </a:lvl5pPr>
-            <a:lvl6pPr marL="457200" algn="ctr" rtl="0" fontAlgn="base">
-              <a:spcBef>
-                <a:spcPct val="0"/>
-              </a:spcBef>
-              <a:spcAft>
-                <a:spcPct val="0"/>
-              </a:spcAft>
-              <a:defRPr sz="4400">
-                <a:solidFill>
-                  <a:schemeClr val="tx2"/>
-                </a:solidFill>
-                <a:latin typeface="Arial" panose="020B0604020202020204" pitchFamily="34" charset="0"/>
-                <a:cs typeface="Arial" panose="020B0604020202020204" pitchFamily="34" charset="0"/>
-              </a:defRPr>
-            </a:lvl6pPr>
-            <a:lvl7pPr marL="914400" algn="ctr" rtl="0" fontAlgn="base">
-              <a:spcBef>
-                <a:spcPct val="0"/>
-              </a:spcBef>
-              <a:spcAft>
-                <a:spcPct val="0"/>
-              </a:spcAft>
-              <a:defRPr sz="4400">
-                <a:solidFill>
-                  <a:schemeClr val="tx2"/>
-                </a:solidFill>
-                <a:latin typeface="Arial" panose="020B0604020202020204" pitchFamily="34" charset="0"/>
-                <a:cs typeface="Arial" panose="020B0604020202020204" pitchFamily="34" charset="0"/>
-              </a:defRPr>
-            </a:lvl7pPr>
-            <a:lvl8pPr marL="1371600" algn="ctr" rtl="0" fontAlgn="base">
-              <a:spcBef>
-                <a:spcPct val="0"/>
-              </a:spcBef>
-              <a:spcAft>
-                <a:spcPct val="0"/>
-              </a:spcAft>
-              <a:defRPr sz="4400">
-                <a:solidFill>
-                  <a:schemeClr val="tx2"/>
-                </a:solidFill>
-                <a:latin typeface="Arial" panose="020B0604020202020204" pitchFamily="34" charset="0"/>
-                <a:cs typeface="Arial" panose="020B0604020202020204" pitchFamily="34" charset="0"/>
-              </a:defRPr>
-            </a:lvl8pPr>
-            <a:lvl9pPr marL="1828800" algn="ctr" rtl="0" fontAlgn="base">
-              <a:spcBef>
-                <a:spcPct val="0"/>
-              </a:spcBef>
-              <a:spcAft>
-                <a:spcPct val="0"/>
-              </a:spcAft>
-              <a:defRPr sz="4400">
-                <a:solidFill>
-                  <a:schemeClr val="tx2"/>
-                </a:solidFill>
-                <a:latin typeface="Arial" panose="020B0604020202020204" pitchFamily="34" charset="0"/>
-                <a:cs typeface="Arial" panose="020B0604020202020204" pitchFamily="34" charset="0"/>
-              </a:defRPr>
-            </a:lvl9pPr>
-          </a:lstStyle>
-          <a:p>
-            <a:pPr eaLnBrk="1" hangingPunct="1"/>
-            <a:r>
-              <a:rPr lang="ko-KR" altLang="en-US" sz="3200" b="1">
-                <a:solidFill>
-                  <a:schemeClr val="tx1"/>
-                </a:solidFill>
-              </a:rPr>
-              <a:t>구현 문제 회고</a:t>
-            </a:r>
-            <a:endParaRPr lang="es-ES" altLang="ko-KR" sz="3200" b="1">
-              <a:solidFill>
-                <a:schemeClr val="tx1"/>
-              </a:solidFill>
-            </a:endParaRPr>
-          </a:p>
-        </p:txBody>
-      </p:sp>
-    </p:spTree>
-    <p:extLst>
-      <p:ext uri="{BB962C8B-B14F-4D97-AF65-F5344CB8AC3E}">
-        <p14:creationId xmlns:p14="http://schemas.microsoft.com/office/powerpoint/2010/main" val="2786326258"/>
-      </p:ext>
-    </p:extLst>
-  </p:cSld>
-  <p:clrMapOvr>
-    <a:masterClrMapping/>
-  </p:clrMapOvr>
-</p:sld>
-</file>
-
-<file path=ppt/slides/slide15.xml><?xml version="1.0" encoding="utf-8"?>
-<p:sld xmlns:a="http://schemas.openxmlformats.org/drawingml/2006/main" xmlns:r="http://schemas.openxmlformats.org/officeDocument/2006/relationships" xmlns:p="http://schemas.openxmlformats.org/presentationml/2006/main">
-  <p:cSld>
-    <p:spTree>
-      <p:nvGrpSpPr>
-        <p:cNvPr id="1" name=""/>
-        <p:cNvGrpSpPr/>
-        <p:nvPr/>
-      </p:nvGrpSpPr>
-      <p:grpSpPr>
-        <a:xfrm>
-          <a:off x="0" y="0"/>
-          <a:ext cx="0" cy="0"/>
-          <a:chOff x="0" y="0"/>
-          <a:chExt cx="0" cy="0"/>
-        </a:xfrm>
-      </p:grpSpPr>
-      <p:sp>
-        <p:nvSpPr>
-          <p:cNvPr id="5122" name="Rectangle 2">
-            <a:extLst>
-              <a:ext uri="{FF2B5EF4-FFF2-40B4-BE49-F238E27FC236}">
-                <a16:creationId xmlns:a16="http://schemas.microsoft.com/office/drawing/2014/main" id="{5A5441BC-21C9-4C4E-8617-73A39EC832C7}"/>
-              </a:ext>
-            </a:extLst>
-          </p:cNvPr>
-          <p:cNvSpPr>
-            <a:spLocks noGrp="1" noChangeArrowheads="1"/>
-          </p:cNvSpPr>
-          <p:nvPr>
-            <p:ph type="title"/>
-          </p:nvPr>
-        </p:nvSpPr>
-        <p:spPr>
-          <a:xfrm>
-            <a:off x="457200" y="188913"/>
-            <a:ext cx="8229600" cy="1295400"/>
-          </a:xfrm>
-        </p:spPr>
-        <p:txBody>
-          <a:bodyPr/>
-          <a:lstStyle/>
-          <a:p>
-            <a:pPr algn="l" eaLnBrk="1" hangingPunct="1">
-              <a:defRPr/>
-            </a:pPr>
-            <a:r>
-              <a:rPr lang="ko-KR" altLang="en-US" sz="3200">
-                <a:solidFill>
-                  <a:schemeClr val="tx1"/>
-                </a:solidFill>
-              </a:rPr>
-              <a:t>구현 문제 회고</a:t>
-            </a:r>
-            <a:endParaRPr lang="ko-KR" altLang="ko-KR" sz="2000">
-              <a:solidFill>
-                <a:schemeClr val="tx1"/>
-              </a:solidFill>
-            </a:endParaRPr>
-          </a:p>
-        </p:txBody>
-      </p:sp>
-      <p:cxnSp>
-        <p:nvCxnSpPr>
-          <p:cNvPr id="3" name="직선 연결선 2">
-            <a:extLst>
-              <a:ext uri="{FF2B5EF4-FFF2-40B4-BE49-F238E27FC236}">
-                <a16:creationId xmlns:a16="http://schemas.microsoft.com/office/drawing/2014/main" id="{00016A16-78F9-4CDB-B5A3-E7D1D56285D2}"/>
-              </a:ext>
-            </a:extLst>
-          </p:cNvPr>
-          <p:cNvCxnSpPr/>
-          <p:nvPr/>
-        </p:nvCxnSpPr>
-        <p:spPr bwMode="auto">
-          <a:xfrm>
-            <a:off x="575556" y="1268760"/>
-            <a:ext cx="7992888" cy="0"/>
-          </a:xfrm>
-          <a:prstGeom prst="line">
-            <a:avLst/>
-          </a:prstGeom>
-          <a:solidFill>
-            <a:schemeClr val="accent1"/>
-          </a:solidFill>
-          <a:ln w="25400" cap="flat" cmpd="sng" algn="ctr">
-            <a:solidFill>
-              <a:schemeClr val="tx1"/>
-            </a:solidFill>
-            <a:prstDash val="solid"/>
-            <a:round/>
-            <a:headEnd type="none" w="med" len="med"/>
-            <a:tailEnd type="none" w="med" len="med"/>
-          </a:ln>
-          <a:effectLst/>
-          <a:extLst>
-            <a:ext uri="{AF507438-7753-43E0-B8FC-AC1667EBCBE1}">
-              <a14:hiddenEffects xmlns:a14="http://schemas.microsoft.com/office/drawing/2010/main">
-                <a:effectLst>
-                  <a:outerShdw dist="35921" dir="2700000" algn="ctr" rotWithShape="0">
-                    <a:schemeClr val="bg2"/>
-                  </a:outerShdw>
-                </a:effectLst>
-              </a14:hiddenEffects>
-            </a:ext>
-          </a:extLst>
-        </p:spPr>
-      </p:cxnSp>
-      <p:graphicFrame>
-        <p:nvGraphicFramePr>
-          <p:cNvPr id="6" name="표 5">
-            <a:extLst>
-              <a:ext uri="{FF2B5EF4-FFF2-40B4-BE49-F238E27FC236}">
-                <a16:creationId xmlns:a16="http://schemas.microsoft.com/office/drawing/2014/main" id="{0C5DA2A0-6065-454B-8D2D-824C2F9E0194}"/>
-              </a:ext>
-            </a:extLst>
-          </p:cNvPr>
-          <p:cNvGraphicFramePr>
-            <a:graphicFrameLocks noGrp="1"/>
-          </p:cNvGraphicFramePr>
-          <p:nvPr>
-            <p:extLst>
-              <p:ext uri="{D42A27DB-BD31-4B8C-83A1-F6EECF244321}">
-                <p14:modId xmlns:p14="http://schemas.microsoft.com/office/powerpoint/2010/main" val="1793941456"/>
-              </p:ext>
-            </p:extLst>
-          </p:nvPr>
-        </p:nvGraphicFramePr>
-        <p:xfrm>
-          <a:off x="587210" y="1700808"/>
-          <a:ext cx="7981233" cy="1106271"/>
-        </p:xfrm>
-        <a:graphic>
-          <a:graphicData uri="http://schemas.openxmlformats.org/drawingml/2006/table">
-            <a:tbl>
-              <a:tblPr/>
-              <a:tblGrid>
-                <a:gridCol w="1104470">
-                  <a:extLst>
-                    <a:ext uri="{9D8B030D-6E8A-4147-A177-3AD203B41FA5}">
-                      <a16:colId xmlns:a16="http://schemas.microsoft.com/office/drawing/2014/main" val="3304577932"/>
-                    </a:ext>
-                  </a:extLst>
-                </a:gridCol>
-                <a:gridCol w="3240360">
-                  <a:extLst>
-                    <a:ext uri="{9D8B030D-6E8A-4147-A177-3AD203B41FA5}">
-                      <a16:colId xmlns:a16="http://schemas.microsoft.com/office/drawing/2014/main" val="3115447191"/>
-                    </a:ext>
-                  </a:extLst>
-                </a:gridCol>
-                <a:gridCol w="3636403">
-                  <a:extLst>
-                    <a:ext uri="{9D8B030D-6E8A-4147-A177-3AD203B41FA5}">
-                      <a16:colId xmlns:a16="http://schemas.microsoft.com/office/drawing/2014/main" val="1389000781"/>
-                    </a:ext>
-                  </a:extLst>
-                </a:gridCol>
-              </a:tblGrid>
-              <a:tr h="368757">
-                <a:tc>
-                  <a:txBody>
-                    <a:bodyPr/>
-                    <a:lstStyle/>
-                    <a:p>
-                      <a:pPr latinLnBrk="1"/>
-                      <a:endParaRPr lang="ko-KR" altLang="en-US" sz="1400"/>
-                    </a:p>
-                  </a:txBody>
-                  <a:tcPr>
-                    <a:lnL w="12700" cmpd="sng">
-                      <a:solidFill>
-                        <a:schemeClr val="tx1"/>
-                      </a:solidFill>
-                      <a:prstDash val="solid"/>
-                    </a:lnL>
-                    <a:lnR w="12700" cap="flat" cmpd="sng" algn="ctr">
-                      <a:solidFill>
-                        <a:schemeClr val="tx1"/>
-                      </a:solidFill>
-                      <a:prstDash val="solid"/>
-                      <a:round/>
-                      <a:headEnd type="none" w="med" len="med"/>
-                      <a:tailEnd type="none" w="med" len="med"/>
-                    </a:lnR>
-                    <a:lnT w="12700" cmpd="sng">
-                      <a:solidFill>
-                        <a:schemeClr val="tx1"/>
-                      </a:solidFill>
-                      <a:prstDash val="solid"/>
-                    </a:lnT>
-                    <a:lnB w="12700" cap="flat" cmpd="sng" algn="ctr">
-                      <a:solidFill>
-                        <a:schemeClr val="tx1"/>
-                      </a:solidFill>
-                      <a:prstDash val="solid"/>
-                      <a:round/>
-                      <a:headEnd type="none" w="med" len="med"/>
-                      <a:tailEnd type="none" w="med" len="med"/>
-                    </a:lnB>
-                  </a:tcPr>
-                </a:tc>
-                <a:tc>
-                  <a:txBody>
-                    <a:bodyPr/>
-                    <a:lstStyle/>
-                    <a:p>
-                      <a:pPr latinLnBrk="1"/>
-                      <a:r>
-                        <a:rPr lang="ko-KR" altLang="en-US" sz="1400"/>
-                        <a:t>배열 기반 해시 테이블</a:t>
-                      </a:r>
-                    </a:p>
-                  </a:txBody>
-                  <a:tcPr>
-                    <a:lnL w="12700" cmpd="sng">
-                      <a:solidFill>
-                        <a:schemeClr val="tx1"/>
-                      </a:solidFill>
-                      <a:prstDash val="solid"/>
-                    </a:lnL>
-                    <a:lnR w="12700" cap="flat" cmpd="sng" algn="ctr">
-                      <a:solidFill>
-                        <a:schemeClr val="tx1"/>
-                      </a:solidFill>
-                      <a:prstDash val="solid"/>
-                      <a:round/>
-                      <a:headEnd type="none" w="med" len="med"/>
-                      <a:tailEnd type="none" w="med" len="med"/>
-                    </a:lnR>
-                    <a:lnT w="12700" cmpd="sng">
-                      <a:solidFill>
-                        <a:schemeClr val="tx1"/>
-                      </a:solidFill>
-                      <a:prstDash val="solid"/>
-                    </a:lnT>
-                    <a:lnB w="12700" cap="flat" cmpd="sng" algn="ctr">
-                      <a:solidFill>
-                        <a:schemeClr val="tx1"/>
-                      </a:solidFill>
-                      <a:prstDash val="solid"/>
-                      <a:round/>
-                      <a:headEnd type="none" w="med" len="med"/>
-                      <a:tailEnd type="none" w="med" len="med"/>
-                    </a:lnB>
-                  </a:tcPr>
-                </a:tc>
-                <a:tc>
-                  <a:txBody>
-                    <a:bodyPr/>
-                    <a:lstStyle/>
-                    <a:p>
-                      <a:pPr latinLnBrk="1"/>
-                      <a:r>
-                        <a:rPr lang="ko-KR" altLang="en-US" sz="1400"/>
-                        <a:t>객체 기반 해시 테이블</a:t>
-                      </a:r>
-                    </a:p>
-                  </a:txBody>
-                  <a:tcPr>
-                    <a:lnL w="12700" cap="flat" cmpd="sng" algn="ctr">
-                      <a:solidFill>
-                        <a:schemeClr val="tx1"/>
-                      </a:solidFill>
-                      <a:prstDash val="solid"/>
-                      <a:round/>
-                      <a:headEnd type="none" w="med" len="med"/>
-                      <a:tailEnd type="none" w="med" len="med"/>
-                    </a:lnL>
-                    <a:lnR w="12700" cmpd="sng">
-                      <a:solidFill>
-                        <a:schemeClr val="tx1"/>
-                      </a:solidFill>
-                      <a:prstDash val="solid"/>
-                    </a:lnR>
-                    <a:lnT w="12700" cmpd="sng">
-                      <a:solidFill>
-                        <a:schemeClr val="tx1"/>
-                      </a:solidFill>
-                      <a:prstDash val="solid"/>
-                    </a:lnT>
-                    <a:lnB w="12700" cap="flat" cmpd="sng" algn="ctr">
-                      <a:solidFill>
-                        <a:schemeClr val="tx1"/>
-                      </a:solidFill>
-                      <a:prstDash val="solid"/>
-                      <a:round/>
-                      <a:headEnd type="none" w="med" len="med"/>
-                      <a:tailEnd type="none" w="med" len="med"/>
-                    </a:lnB>
-                    <a:solidFill>
-                      <a:srgbClr val="E6E6C4"/>
-                    </a:solidFill>
-                  </a:tcPr>
-                </a:tc>
-                <a:extLst>
-                  <a:ext uri="{0D108BD9-81ED-4DB2-BD59-A6C34878D82A}">
-                    <a16:rowId xmlns:a16="http://schemas.microsoft.com/office/drawing/2014/main" val="1378220521"/>
-                  </a:ext>
-                </a:extLst>
-              </a:tr>
-              <a:tr h="368757">
-                <a:tc>
-                  <a:txBody>
-                    <a:bodyPr/>
-                    <a:lstStyle/>
-                    <a:p>
-                      <a:pPr latinLnBrk="1"/>
-                      <a:r>
-                        <a:rPr lang="ko-KR" altLang="en-US" sz="1400"/>
-                        <a:t>사용시기</a:t>
-                      </a:r>
-                    </a:p>
-                  </a:txBody>
-                  <a:tcPr>
-                    <a:lnL w="12700" cmpd="sng">
-                      <a:solidFill>
-                        <a:schemeClr val="tx1"/>
-                      </a:solidFill>
-                      <a:prstDash val="solid"/>
-                    </a:lnL>
-                    <a:lnR w="12700" cap="flat" cmpd="sng" algn="ctr">
-                      <a:solidFill>
-                        <a:schemeClr val="tx1"/>
-                      </a:solidFill>
-                      <a:prstDash val="solid"/>
-                      <a:round/>
-                      <a:headEnd type="none" w="med" len="med"/>
-                      <a:tailEnd type="none" w="med" len="med"/>
-                    </a:lnR>
-                    <a:lnT w="12700" cap="flat" cmpd="sng" algn="ctr">
-                      <a:solidFill>
-                        <a:schemeClr val="tx1"/>
-                      </a:solidFill>
-                      <a:prstDash val="solid"/>
-                      <a:round/>
-                      <a:headEnd type="none" w="med" len="med"/>
-                      <a:tailEnd type="none" w="med" len="med"/>
-                    </a:lnT>
-                    <a:lnB w="12700" cap="flat" cmpd="sng" algn="ctr">
-                      <a:solidFill>
-                        <a:schemeClr val="tx1"/>
-                      </a:solidFill>
-                      <a:prstDash val="solid"/>
-                      <a:round/>
-                      <a:headEnd type="none" w="med" len="med"/>
-                      <a:tailEnd type="none" w="med" len="med"/>
-                    </a:lnB>
-                  </a:tcPr>
-                </a:tc>
-                <a:tc>
-                  <a:txBody>
-                    <a:bodyPr/>
-                    <a:lstStyle/>
-                    <a:p>
-                      <a:pPr latinLnBrk="1"/>
-                      <a:r>
-                        <a:rPr lang="ko-KR" altLang="en-US" sz="1400"/>
-                        <a:t>자료구조의 크기가 주어졌을 때</a:t>
-                      </a:r>
-                    </a:p>
-                  </a:txBody>
-                  <a:tcPr>
-                    <a:lnL w="12700" cap="flat" cmpd="sng" algn="ctr">
-                      <a:solidFill>
-                        <a:schemeClr val="tx1"/>
-                      </a:solidFill>
-                      <a:prstDash val="solid"/>
-                      <a:round/>
-                      <a:headEnd type="none" w="med" len="med"/>
-                      <a:tailEnd type="none" w="med" len="med"/>
-                    </a:lnL>
-                    <a:lnR w="12700" cap="flat" cmpd="sng" algn="ctr">
-                      <a:solidFill>
-                        <a:schemeClr val="tx1"/>
-                      </a:solidFill>
-                      <a:prstDash val="solid"/>
-                      <a:round/>
-                      <a:headEnd type="none" w="med" len="med"/>
-                      <a:tailEnd type="none" w="med" len="med"/>
-                    </a:lnR>
-                    <a:lnT w="12700" cap="flat" cmpd="sng" algn="ctr">
-                      <a:solidFill>
-                        <a:schemeClr val="tx1"/>
-                      </a:solidFill>
-                      <a:prstDash val="solid"/>
-                      <a:round/>
-                      <a:headEnd type="none" w="med" len="med"/>
-                      <a:tailEnd type="none" w="med" len="med"/>
-                    </a:lnT>
-                    <a:lnB w="12700" cap="flat" cmpd="sng" algn="ctr">
-                      <a:solidFill>
-                        <a:schemeClr val="tx1"/>
-                      </a:solidFill>
-                      <a:prstDash val="solid"/>
-                      <a:round/>
-                      <a:headEnd type="none" w="med" len="med"/>
-                      <a:tailEnd type="none" w="med" len="med"/>
-                    </a:lnB>
-                  </a:tcPr>
-                </a:tc>
-                <a:tc>
-                  <a:txBody>
-                    <a:bodyPr/>
-                    <a:lstStyle/>
-                    <a:p>
-                      <a:pPr latinLnBrk="1"/>
-                      <a:r>
-                        <a:rPr lang="ko-KR" altLang="en-US" sz="1400"/>
-                        <a:t>자료구조가 동적일 때</a:t>
-                      </a:r>
-                    </a:p>
-                  </a:txBody>
-                  <a:tcPr>
-                    <a:lnL w="12700" cap="flat" cmpd="sng" algn="ctr">
-                      <a:solidFill>
-                        <a:schemeClr val="tx1"/>
-                      </a:solidFill>
-                      <a:prstDash val="solid"/>
-                      <a:round/>
-                      <a:headEnd type="none" w="med" len="med"/>
-                      <a:tailEnd type="none" w="med" len="med"/>
-                    </a:lnL>
-                    <a:lnR w="12700" cmpd="sng">
-                      <a:solidFill>
-                        <a:schemeClr val="tx1"/>
-                      </a:solidFill>
-                      <a:prstDash val="solid"/>
-                    </a:lnR>
-                    <a:lnT w="12700" cap="flat" cmpd="sng" algn="ctr">
-                      <a:solidFill>
-                        <a:schemeClr val="tx1"/>
-                      </a:solidFill>
-                      <a:prstDash val="solid"/>
-                      <a:round/>
-                      <a:headEnd type="none" w="med" len="med"/>
-                      <a:tailEnd type="none" w="med" len="med"/>
-                    </a:lnT>
-                    <a:lnB w="12700" cap="flat" cmpd="sng" algn="ctr">
-                      <a:solidFill>
-                        <a:schemeClr val="tx1"/>
-                      </a:solidFill>
-                      <a:prstDash val="solid"/>
-                      <a:round/>
-                      <a:headEnd type="none" w="med" len="med"/>
-                      <a:tailEnd type="none" w="med" len="med"/>
-                    </a:lnB>
-                  </a:tcPr>
-                </a:tc>
-                <a:extLst>
-                  <a:ext uri="{0D108BD9-81ED-4DB2-BD59-A6C34878D82A}">
-                    <a16:rowId xmlns:a16="http://schemas.microsoft.com/office/drawing/2014/main" val="550682330"/>
-                  </a:ext>
-                </a:extLst>
-              </a:tr>
-              <a:tr h="368757">
-                <a:tc>
-                  <a:txBody>
-                    <a:bodyPr/>
-                    <a:lstStyle/>
-                    <a:p>
-                      <a:pPr latinLnBrk="1"/>
-                      <a:r>
-                        <a:rPr lang="ko-KR" altLang="en-US" sz="1400"/>
-                        <a:t>효과</a:t>
-                      </a:r>
-                    </a:p>
-                  </a:txBody>
-                  <a:tcPr>
-                    <a:lnL w="12700" cmpd="sng">
-                      <a:solidFill>
-                        <a:schemeClr val="tx1"/>
-                      </a:solidFill>
-                      <a:prstDash val="solid"/>
-                    </a:lnL>
-                    <a:lnR w="12700" cap="flat" cmpd="sng" algn="ctr">
-                      <a:solidFill>
-                        <a:schemeClr val="tx1"/>
-                      </a:solidFill>
-                      <a:prstDash val="solid"/>
-                      <a:round/>
-                      <a:headEnd type="none" w="med" len="med"/>
-                      <a:tailEnd type="none" w="med" len="med"/>
-                    </a:lnR>
-                    <a:lnT w="12700" cap="flat" cmpd="sng" algn="ctr">
-                      <a:solidFill>
-                        <a:schemeClr val="tx1"/>
-                      </a:solidFill>
-                      <a:prstDash val="solid"/>
-                      <a:round/>
-                      <a:headEnd type="none" w="med" len="med"/>
-                      <a:tailEnd type="none" w="med" len="med"/>
-                    </a:lnT>
-                    <a:lnB w="12700" cmpd="sng">
-                      <a:solidFill>
-                        <a:schemeClr val="tx1"/>
-                      </a:solidFill>
-                      <a:prstDash val="solid"/>
-                    </a:lnB>
-                  </a:tcPr>
-                </a:tc>
-                <a:tc>
-                  <a:txBody>
-                    <a:bodyPr/>
-                    <a:lstStyle/>
-                    <a:p>
-                      <a:pPr marL="0" marR="0" lvl="0" indent="0" algn="l" defTabSz="914400" rtl="0" eaLnBrk="1" fontAlgn="auto" latinLnBrk="1" hangingPunct="1">
-                        <a:lnSpc>
-                          <a:spcPct val="100000"/>
-                        </a:lnSpc>
-                        <a:spcBef>
-                          <a:spcPts val="0"/>
-                        </a:spcBef>
-                        <a:spcAft>
-                          <a:spcPts val="0"/>
-                        </a:spcAft>
-                        <a:buClrTx/>
-                        <a:buSzTx/>
-                        <a:buFontTx/>
-                        <a:buNone/>
-                        <a:tabLst/>
-                        <a:defRPr/>
-                      </a:pPr>
-                      <a:r>
-                        <a:rPr lang="ko-KR" altLang="en-US" sz="1400">
-                          <a:solidFill>
-                            <a:srgbClr val="000000"/>
-                          </a:solidFill>
-                          <a:latin typeface="맑은 고딕" panose="020B0503020000020004" pitchFamily="50" charset="-127"/>
-                          <a:ea typeface="맑은 고딕" panose="020B0503020000020004" pitchFamily="50" charset="-127"/>
-                        </a:rPr>
-                        <a:t>메모리의 밀집도</a:t>
-                      </a:r>
-                      <a:endParaRPr lang="en-US" altLang="ko-KR" sz="1400">
-                        <a:solidFill>
-                          <a:srgbClr val="000000"/>
-                        </a:solidFill>
-                        <a:latin typeface="맑은 고딕" panose="020B0503020000020004" pitchFamily="50" charset="-127"/>
-                        <a:ea typeface="맑은 고딕" panose="020B0503020000020004" pitchFamily="50" charset="-127"/>
-                      </a:endParaRPr>
-                    </a:p>
-                  </a:txBody>
-                  <a:tcPr>
-                    <a:lnL w="12700" cap="flat" cmpd="sng" algn="ctr">
-                      <a:solidFill>
-                        <a:schemeClr val="tx1"/>
-                      </a:solidFill>
-                      <a:prstDash val="solid"/>
-                      <a:round/>
-                      <a:headEnd type="none" w="med" len="med"/>
-                      <a:tailEnd type="none" w="med" len="med"/>
-                    </a:lnL>
-                    <a:lnR w="12700" cap="flat" cmpd="sng" algn="ctr">
-                      <a:solidFill>
-                        <a:schemeClr val="tx1"/>
-                      </a:solidFill>
-                      <a:prstDash val="solid"/>
-                      <a:round/>
-                      <a:headEnd type="none" w="med" len="med"/>
-                      <a:tailEnd type="none" w="med" len="med"/>
-                    </a:lnR>
-                    <a:lnT w="12700" cap="flat" cmpd="sng" algn="ctr">
-                      <a:solidFill>
-                        <a:schemeClr val="tx1"/>
-                      </a:solidFill>
-                      <a:prstDash val="solid"/>
-                      <a:round/>
-                      <a:headEnd type="none" w="med" len="med"/>
-                      <a:tailEnd type="none" w="med" len="med"/>
-                    </a:lnT>
-                    <a:lnB w="12700" cmpd="sng">
-                      <a:solidFill>
-                        <a:schemeClr val="tx1"/>
-                      </a:solidFill>
-                      <a:prstDash val="solid"/>
-                    </a:lnB>
-                  </a:tcPr>
-                </a:tc>
-                <a:tc>
-                  <a:txBody>
-                    <a:bodyPr/>
-                    <a:lstStyle/>
-                    <a:p>
-                      <a:pPr marL="0" marR="0" lvl="0" indent="0" algn="l" defTabSz="914400" rtl="0" eaLnBrk="1" fontAlgn="auto" latinLnBrk="1" hangingPunct="1">
-                        <a:lnSpc>
-                          <a:spcPct val="100000"/>
-                        </a:lnSpc>
-                        <a:spcBef>
-                          <a:spcPts val="0"/>
-                        </a:spcBef>
-                        <a:spcAft>
-                          <a:spcPts val="0"/>
-                        </a:spcAft>
-                        <a:buClrTx/>
-                        <a:buSzTx/>
-                        <a:buFontTx/>
-                        <a:buNone/>
-                        <a:tabLst/>
-                        <a:defRPr/>
-                      </a:pPr>
-                      <a:r>
-                        <a:rPr lang="ko-KR" altLang="en-US" sz="1400">
-                          <a:solidFill>
-                            <a:srgbClr val="000000"/>
-                          </a:solidFill>
-                          <a:latin typeface="맑은 고딕" panose="020B0503020000020004" pitchFamily="50" charset="-127"/>
-                          <a:ea typeface="맑은 고딕" panose="020B0503020000020004" pitchFamily="50" charset="-127"/>
-                        </a:rPr>
-                        <a:t>배열에서 생기는 빈 공간을 없애기 위해</a:t>
-                      </a:r>
-                      <a:endParaRPr lang="en-US" altLang="ko-KR" sz="1400">
-                        <a:solidFill>
-                          <a:srgbClr val="000000"/>
-                        </a:solidFill>
-                        <a:latin typeface="맑은 고딕" panose="020B0503020000020004" pitchFamily="50" charset="-127"/>
-                        <a:ea typeface="맑은 고딕" panose="020B0503020000020004" pitchFamily="50" charset="-127"/>
-                      </a:endParaRPr>
-                    </a:p>
-                  </a:txBody>
-                  <a:tcPr>
-                    <a:lnL w="12700" cap="flat" cmpd="sng" algn="ctr">
-                      <a:solidFill>
-                        <a:schemeClr val="tx1"/>
-                      </a:solidFill>
-                      <a:prstDash val="solid"/>
-                      <a:round/>
-                      <a:headEnd type="none" w="med" len="med"/>
-                      <a:tailEnd type="none" w="med" len="med"/>
-                    </a:lnL>
-                    <a:lnR w="12700" cmpd="sng">
-                      <a:solidFill>
-                        <a:schemeClr val="tx1"/>
-                      </a:solidFill>
-                      <a:prstDash val="solid"/>
-                    </a:lnR>
-                    <a:lnT w="12700" cap="flat" cmpd="sng" algn="ctr">
-                      <a:solidFill>
-                        <a:schemeClr val="tx1"/>
-                      </a:solidFill>
-                      <a:prstDash val="solid"/>
-                      <a:round/>
-                      <a:headEnd type="none" w="med" len="med"/>
-                      <a:tailEnd type="none" w="med" len="med"/>
-                    </a:lnT>
-                    <a:lnB w="12700" cmpd="sng">
-                      <a:solidFill>
-                        <a:schemeClr val="tx1"/>
-                      </a:solidFill>
-                      <a:prstDash val="solid"/>
-                    </a:lnB>
-                    <a:solidFill>
-                      <a:schemeClr val="bg1"/>
-                    </a:solidFill>
-                  </a:tcPr>
-                </a:tc>
-                <a:extLst>
-                  <a:ext uri="{0D108BD9-81ED-4DB2-BD59-A6C34878D82A}">
-                    <a16:rowId xmlns:a16="http://schemas.microsoft.com/office/drawing/2014/main" val="497945494"/>
-                  </a:ext>
-                </a:extLst>
-              </a:tr>
-            </a:tbl>
-          </a:graphicData>
-        </a:graphic>
-      </p:graphicFrame>
-      <p:grpSp>
-        <p:nvGrpSpPr>
-          <p:cNvPr id="16" name="그룹 15">
-            <a:extLst>
-              <a:ext uri="{FF2B5EF4-FFF2-40B4-BE49-F238E27FC236}">
-                <a16:creationId xmlns:a16="http://schemas.microsoft.com/office/drawing/2014/main" id="{9D11834E-9C4A-4CE7-9A44-2F3DDFFCE9F7}"/>
-              </a:ext>
-            </a:extLst>
-          </p:cNvPr>
-          <p:cNvGrpSpPr/>
-          <p:nvPr/>
-        </p:nvGrpSpPr>
-        <p:grpSpPr>
-          <a:xfrm>
-            <a:off x="-36512" y="3023574"/>
-            <a:ext cx="9191778" cy="3255007"/>
-            <a:chOff x="-36512" y="3023574"/>
-            <a:chExt cx="9191778" cy="3255007"/>
-          </a:xfrm>
-        </p:grpSpPr>
-        <p:pic>
-          <p:nvPicPr>
-            <p:cNvPr id="13" name="그림 12">
-              <a:extLst>
-                <a:ext uri="{FF2B5EF4-FFF2-40B4-BE49-F238E27FC236}">
-                  <a16:creationId xmlns:a16="http://schemas.microsoft.com/office/drawing/2014/main" id="{FDFA3A2E-4459-4D5A-861A-EBCE7878599A}"/>
-                </a:ext>
-              </a:extLst>
-            </p:cNvPr>
-            <p:cNvPicPr>
-              <a:picLocks noChangeAspect="1"/>
-            </p:cNvPicPr>
-            <p:nvPr/>
-          </p:nvPicPr>
-          <p:blipFill>
-            <a:blip r:embed="rId2"/>
-            <a:stretch>
-              <a:fillRect/>
-            </a:stretch>
-          </p:blipFill>
-          <p:spPr>
-            <a:xfrm>
-              <a:off x="11266" y="3023574"/>
-              <a:ext cx="9144000" cy="3255007"/>
-            </a:xfrm>
-            <a:prstGeom prst="rect">
-              <a:avLst/>
-            </a:prstGeom>
-          </p:spPr>
-        </p:pic>
-        <p:cxnSp>
-          <p:nvCxnSpPr>
-            <p:cNvPr id="15" name="직선 연결선 14">
-              <a:extLst>
-                <a:ext uri="{FF2B5EF4-FFF2-40B4-BE49-F238E27FC236}">
-                  <a16:creationId xmlns:a16="http://schemas.microsoft.com/office/drawing/2014/main" id="{4292D256-7FCA-43E3-AB52-15B1145AB5DA}"/>
-                </a:ext>
-              </a:extLst>
-            </p:cNvPr>
-            <p:cNvCxnSpPr/>
-            <p:nvPr/>
-          </p:nvCxnSpPr>
-          <p:spPr bwMode="auto">
-            <a:xfrm>
-              <a:off x="-36512" y="4437112"/>
-              <a:ext cx="1152128" cy="0"/>
-            </a:xfrm>
-            <a:prstGeom prst="line">
-              <a:avLst/>
-            </a:prstGeom>
-            <a:solidFill>
-              <a:schemeClr val="accent1"/>
-            </a:solidFill>
-            <a:ln w="38100" cap="flat" cmpd="sng" algn="ctr">
-              <a:solidFill>
-                <a:srgbClr val="FF0000"/>
-              </a:solidFill>
-              <a:prstDash val="solid"/>
-              <a:round/>
-              <a:headEnd type="none" w="med" len="med"/>
-              <a:tailEnd type="none" w="med" len="med"/>
-            </a:ln>
-            <a:effectLst/>
-            <a:extLst>
-              <a:ext uri="{AF507438-7753-43E0-B8FC-AC1667EBCBE1}">
-                <a14:hiddenEffects xmlns:a14="http://schemas.microsoft.com/office/drawing/2010/main">
-                  <a:effectLst>
-                    <a:outerShdw dist="35921" dir="2700000" algn="ctr" rotWithShape="0">
-                      <a:schemeClr val="bg2"/>
-                    </a:outerShdw>
-                  </a:effectLst>
-                </a14:hiddenEffects>
-              </a:ext>
-            </a:extLst>
-          </p:spPr>
-        </p:cxnSp>
-        <p:cxnSp>
-          <p:nvCxnSpPr>
-            <p:cNvPr id="17" name="직선 연결선 16">
-              <a:extLst>
-                <a:ext uri="{FF2B5EF4-FFF2-40B4-BE49-F238E27FC236}">
-                  <a16:creationId xmlns:a16="http://schemas.microsoft.com/office/drawing/2014/main" id="{1F7A1BB4-90B1-4A00-B225-1BBA2ECA24D3}"/>
-                </a:ext>
-              </a:extLst>
-            </p:cNvPr>
-            <p:cNvCxnSpPr/>
-            <p:nvPr/>
-          </p:nvCxnSpPr>
-          <p:spPr bwMode="auto">
-            <a:xfrm>
-              <a:off x="-36512" y="3717032"/>
-              <a:ext cx="1152128" cy="0"/>
-            </a:xfrm>
-            <a:prstGeom prst="line">
-              <a:avLst/>
-            </a:prstGeom>
-            <a:solidFill>
-              <a:schemeClr val="accent1"/>
-            </a:solidFill>
-            <a:ln w="38100" cap="flat" cmpd="sng" algn="ctr">
-              <a:solidFill>
-                <a:srgbClr val="FF0000"/>
-              </a:solidFill>
-              <a:prstDash val="solid"/>
-              <a:round/>
-              <a:headEnd type="none" w="med" len="med"/>
-              <a:tailEnd type="none" w="med" len="med"/>
-            </a:ln>
-            <a:effectLst/>
-            <a:extLst>
-              <a:ext uri="{AF507438-7753-43E0-B8FC-AC1667EBCBE1}">
-                <a14:hiddenEffects xmlns:a14="http://schemas.microsoft.com/office/drawing/2010/main">
-                  <a:effectLst>
-                    <a:outerShdw dist="35921" dir="2700000" algn="ctr" rotWithShape="0">
-                      <a:schemeClr val="bg2"/>
-                    </a:outerShdw>
-                  </a:effectLst>
-                </a14:hiddenEffects>
-              </a:ext>
-            </a:extLst>
-          </p:spPr>
-        </p:cxnSp>
-        <p:cxnSp>
-          <p:nvCxnSpPr>
-            <p:cNvPr id="18" name="직선 연결선 17">
-              <a:extLst>
-                <a:ext uri="{FF2B5EF4-FFF2-40B4-BE49-F238E27FC236}">
-                  <a16:creationId xmlns:a16="http://schemas.microsoft.com/office/drawing/2014/main" id="{9E6879B3-48B1-48BD-A581-176CC6037F53}"/>
-                </a:ext>
-              </a:extLst>
-            </p:cNvPr>
-            <p:cNvCxnSpPr/>
-            <p:nvPr/>
-          </p:nvCxnSpPr>
-          <p:spPr bwMode="auto">
-            <a:xfrm>
-              <a:off x="-36512" y="5733256"/>
-              <a:ext cx="1152128" cy="0"/>
-            </a:xfrm>
-            <a:prstGeom prst="line">
-              <a:avLst/>
-            </a:prstGeom>
-            <a:solidFill>
-              <a:schemeClr val="accent1"/>
-            </a:solidFill>
-            <a:ln w="38100" cap="flat" cmpd="sng" algn="ctr">
-              <a:solidFill>
-                <a:srgbClr val="FF0000"/>
-              </a:solidFill>
-              <a:prstDash val="solid"/>
-              <a:round/>
-              <a:headEnd type="none" w="med" len="med"/>
-              <a:tailEnd type="none" w="med" len="med"/>
-            </a:ln>
-            <a:effectLst/>
-            <a:extLst>
-              <a:ext uri="{AF507438-7753-43E0-B8FC-AC1667EBCBE1}">
-                <a14:hiddenEffects xmlns:a14="http://schemas.microsoft.com/office/drawing/2010/main">
-                  <a:effectLst>
-                    <a:outerShdw dist="35921" dir="2700000" algn="ctr" rotWithShape="0">
-                      <a:schemeClr val="bg2"/>
-                    </a:outerShdw>
-                  </a:effectLst>
-                </a14:hiddenEffects>
-              </a:ext>
-            </a:extLst>
-          </p:spPr>
-        </p:cxnSp>
-      </p:grpSp>
-    </p:spTree>
-    <p:extLst>
-      <p:ext uri="{BB962C8B-B14F-4D97-AF65-F5344CB8AC3E}">
-        <p14:creationId xmlns:p14="http://schemas.microsoft.com/office/powerpoint/2010/main" val="625220945"/>
-      </p:ext>
-    </p:extLst>
-  </p:cSld>
-  <p:clrMapOvr>
-    <a:masterClrMapping/>
-  </p:clrMapOvr>
-  <p:timing>
-    <p:tnLst>
-      <p:par>
-        <p:cTn id="1" dur="indefinite" restart="never" nodeType="tmRoot">
-          <p:childTnLst>
-            <p:seq concurrent="1" nextAc="seek">
-              <p:cTn id="2" dur="indefinite" nodeType="mainSeq">
-                <p:childTnLst>
-                  <p:par>
-                    <p:cTn id="3" fill="hold">
-                      <p:stCondLst>
-                        <p:cond delay="indefinite"/>
-                      </p:stCondLst>
-                      <p:childTnLst>
-                        <p:par>
-                          <p:cTn id="4" fill="hold">
-                            <p:stCondLst>
-                              <p:cond delay="0"/>
-                            </p:stCondLst>
-                            <p:childTnLst>
-                              <p:par>
-                                <p:cTn id="5" presetID="1" presetClass="entr" presetSubtype="0" fill="hold" nodeType="clickEffect">
-                                  <p:stCondLst>
-                                    <p:cond delay="0"/>
-                                  </p:stCondLst>
-                                  <p:childTnLst>
-                                    <p:set>
-                                      <p:cBhvr>
-                                        <p:cTn id="6" dur="1" fill="hold">
-                                          <p:stCondLst>
-                                            <p:cond delay="0"/>
-                                          </p:stCondLst>
-                                        </p:cTn>
-                                        <p:tgtEl>
-                                          <p:spTgt spid="16"/>
-                                        </p:tgtEl>
-                                        <p:attrNameLst>
-                                          <p:attrName>style.visibility</p:attrName>
-                                        </p:attrNameLst>
-                                      </p:cBhvr>
-                                      <p:to>
-                                        <p:strVal val="visible"/>
-                                      </p:to>
-                                    </p:set>
-                                  </p:childTnLst>
-                                </p:cTn>
-                              </p:par>
-                            </p:childTnLst>
-                          </p:cTn>
-                        </p:par>
-                      </p:childTnLst>
-                    </p:cTn>
-                  </p:par>
-                </p:childTnLst>
-              </p:cTn>
-              <p:prevCondLst>
-                <p:cond evt="onPrev" delay="0">
-                  <p:tgtEl>
-                    <p:sldTgt/>
-                  </p:tgtEl>
-                </p:cond>
-              </p:prevCondLst>
-              <p:nextCondLst>
-                <p:cond evt="onNext" delay="0">
-                  <p:tgtEl>
-                    <p:sldTgt/>
-                  </p:tgtEl>
-                </p:cond>
-              </p:nextCondLst>
-            </p:seq>
-          </p:childTnLst>
-        </p:cTn>
-      </p:par>
-    </p:tnLst>
-  </p:timing>
-</p:sld>
-</file>
-
-<file path=ppt/slides/slide16.xml><?xml version="1.0" encoding="utf-8"?>
-<p:sld xmlns:a="http://schemas.openxmlformats.org/drawingml/2006/main" xmlns:r="http://schemas.openxmlformats.org/officeDocument/2006/relationships" xmlns:p="http://schemas.openxmlformats.org/presentationml/2006/main">
-  <p:cSld>
-    <p:spTree>
-      <p:nvGrpSpPr>
-        <p:cNvPr id="1" name=""/>
-        <p:cNvGrpSpPr/>
-        <p:nvPr/>
-      </p:nvGrpSpPr>
-      <p:grpSpPr>
-        <a:xfrm>
-          <a:off x="0" y="0"/>
-          <a:ext cx="0" cy="0"/>
-          <a:chOff x="0" y="0"/>
-          <a:chExt cx="0" cy="0"/>
-        </a:xfrm>
-      </p:grpSpPr>
-      <p:sp>
-        <p:nvSpPr>
-          <p:cNvPr id="9" name="Rectangle 150">
-            <a:extLst>
-              <a:ext uri="{FF2B5EF4-FFF2-40B4-BE49-F238E27FC236}">
-                <a16:creationId xmlns:a16="http://schemas.microsoft.com/office/drawing/2014/main" id="{B6D2B44A-A8AF-419F-A2C5-7317925249E9}"/>
-              </a:ext>
-            </a:extLst>
-          </p:cNvPr>
-          <p:cNvSpPr txBox="1">
-            <a:spLocks noChangeArrowheads="1"/>
-          </p:cNvSpPr>
-          <p:nvPr/>
-        </p:nvSpPr>
-        <p:spPr bwMode="auto">
-          <a:xfrm>
             <a:off x="2159793" y="2781300"/>
             <a:ext cx="4824413" cy="647700"/>
           </a:xfrm>
@@ -8355,202 +7159,6 @@
           </a:p>
         </p:txBody>
       </p:sp>
-      <p:sp>
-        <p:nvSpPr>
-          <p:cNvPr id="30" name="TextBox 29">
-            <a:extLst>
-              <a:ext uri="{FF2B5EF4-FFF2-40B4-BE49-F238E27FC236}">
-                <a16:creationId xmlns:a16="http://schemas.microsoft.com/office/drawing/2014/main" id="{0BECDD99-86FA-4D14-BDB0-CD095962CD79}"/>
-              </a:ext>
-            </a:extLst>
-          </p:cNvPr>
-          <p:cNvSpPr txBox="1"/>
-          <p:nvPr/>
-        </p:nvSpPr>
-        <p:spPr>
-          <a:xfrm>
-            <a:off x="606082" y="5619989"/>
-            <a:ext cx="3270250" cy="369332"/>
-          </a:xfrm>
-          <a:prstGeom prst="rect">
-            <a:avLst/>
-          </a:prstGeom>
-          <a:noFill/>
-          <a:scene3d>
-            <a:camera prst="obliqueTopLeft"/>
-            <a:lightRig rig="threePt" dir="t"/>
-          </a:scene3d>
-        </p:spPr>
-        <p:txBody>
-          <a:bodyPr>
-            <a:spAutoFit/>
-          </a:bodyPr>
-          <a:lstStyle>
-            <a:defPPr>
-              <a:defRPr lang="ko-KR"/>
-            </a:defPPr>
-            <a:lvl1pPr>
-              <a:defRPr sz="2800" spc="-150">
-                <a:latin typeface="나눔스퀘어 ExtraBold" panose="020B0600000101010101" pitchFamily="50" charset="-127"/>
-                <a:ea typeface="나눔스퀘어 ExtraBold" panose="020B0600000101010101" pitchFamily="50" charset="-127"/>
-              </a:defRPr>
-            </a:lvl1pPr>
-          </a:lstStyle>
-          <a:p>
-            <a:pPr eaLnBrk="1" hangingPunct="1">
-              <a:defRPr/>
-            </a:pPr>
-            <a:r>
-              <a:rPr lang="en-US" altLang="ko-KR" sz="1800" b="1" dirty="0">
-                <a:latin typeface="맑은 고딕" panose="020B0503020000020004" pitchFamily="50" charset="-127"/>
-                <a:ea typeface="맑은 고딕" panose="020B0503020000020004" pitchFamily="50" charset="-127"/>
-                <a:cs typeface="Arial" panose="020B0604020202020204" pitchFamily="34" charset="0"/>
-              </a:rPr>
-              <a:t>5</a:t>
-            </a:r>
-            <a:endParaRPr lang="ko-KR" altLang="en-US" sz="1800" b="1" dirty="0">
-              <a:latin typeface="맑은 고딕" panose="020B0503020000020004" pitchFamily="50" charset="-127"/>
-              <a:ea typeface="맑은 고딕" panose="020B0503020000020004" pitchFamily="50" charset="-127"/>
-              <a:cs typeface="Arial" panose="020B0604020202020204" pitchFamily="34" charset="0"/>
-            </a:endParaRPr>
-          </a:p>
-        </p:txBody>
-      </p:sp>
-      <p:grpSp>
-        <p:nvGrpSpPr>
-          <p:cNvPr id="31" name="그룹 30">
-            <a:extLst>
-              <a:ext uri="{FF2B5EF4-FFF2-40B4-BE49-F238E27FC236}">
-                <a16:creationId xmlns:a16="http://schemas.microsoft.com/office/drawing/2014/main" id="{82B9AD94-4C23-4053-A515-1CCAE0BD6CD2}"/>
-              </a:ext>
-            </a:extLst>
-          </p:cNvPr>
-          <p:cNvGrpSpPr/>
-          <p:nvPr/>
-        </p:nvGrpSpPr>
-        <p:grpSpPr>
-          <a:xfrm>
-            <a:off x="2422182" y="5569334"/>
-            <a:ext cx="7918450" cy="806150"/>
-            <a:chOff x="2422182" y="2274905"/>
-            <a:chExt cx="7918450" cy="806150"/>
-          </a:xfrm>
-        </p:grpSpPr>
-        <p:sp>
-          <p:nvSpPr>
-            <p:cNvPr id="32" name="TextBox 31">
-              <a:extLst>
-                <a:ext uri="{FF2B5EF4-FFF2-40B4-BE49-F238E27FC236}">
-                  <a16:creationId xmlns:a16="http://schemas.microsoft.com/office/drawing/2014/main" id="{BFD6E0CB-25C8-4393-95B7-47FF1ECB19D1}"/>
-                </a:ext>
-              </a:extLst>
-            </p:cNvPr>
-            <p:cNvSpPr txBox="1"/>
-            <p:nvPr/>
-          </p:nvSpPr>
-          <p:spPr>
-            <a:xfrm>
-              <a:off x="2422182" y="2274905"/>
-              <a:ext cx="4094034" cy="369332"/>
-            </a:xfrm>
-            <a:prstGeom prst="rect">
-              <a:avLst/>
-            </a:prstGeom>
-            <a:noFill/>
-            <a:scene3d>
-              <a:camera prst="obliqueTopLeft"/>
-              <a:lightRig rig="threePt" dir="t"/>
-            </a:scene3d>
-          </p:spPr>
-          <p:txBody>
-            <a:bodyPr wrap="square">
-              <a:spAutoFit/>
-            </a:bodyPr>
-            <a:lstStyle>
-              <a:defPPr>
-                <a:defRPr lang="ko-KR"/>
-              </a:defPPr>
-              <a:lvl1pPr>
-                <a:defRPr sz="2800" spc="-150">
-                  <a:latin typeface="나눔스퀘어 ExtraBold" panose="020B0600000101010101" pitchFamily="50" charset="-127"/>
-                  <a:ea typeface="나눔스퀘어 ExtraBold" panose="020B0600000101010101" pitchFamily="50" charset="-127"/>
-                </a:defRPr>
-              </a:lvl1pPr>
-            </a:lstStyle>
-            <a:p>
-              <a:pPr eaLnBrk="1" hangingPunct="1">
-                <a:defRPr/>
-              </a:pPr>
-              <a:r>
-                <a:rPr lang="ko-KR" altLang="en-US" sz="1800">
-                  <a:latin typeface="맑은 고딕" panose="020B0503020000020004" pitchFamily="50" charset="-127"/>
-                  <a:ea typeface="맑은 고딕" panose="020B0503020000020004" pitchFamily="50" charset="-127"/>
-                  <a:cs typeface="Arial" panose="020B0604020202020204" pitchFamily="34" charset="0"/>
-                </a:rPr>
-                <a:t>구현 문제 회고</a:t>
-              </a:r>
-              <a:endParaRPr lang="ko-KR" altLang="en-US" sz="1800" dirty="0">
-                <a:latin typeface="맑은 고딕" panose="020B0503020000020004" pitchFamily="50" charset="-127"/>
-                <a:ea typeface="맑은 고딕" panose="020B0503020000020004" pitchFamily="50" charset="-127"/>
-                <a:cs typeface="Arial" panose="020B0604020202020204" pitchFamily="34" charset="0"/>
-              </a:endParaRPr>
-            </a:p>
-          </p:txBody>
-        </p:sp>
-        <p:sp>
-          <p:nvSpPr>
-            <p:cNvPr id="33" name="TextBox 32">
-              <a:extLst>
-                <a:ext uri="{FF2B5EF4-FFF2-40B4-BE49-F238E27FC236}">
-                  <a16:creationId xmlns:a16="http://schemas.microsoft.com/office/drawing/2014/main" id="{8531B897-5C16-4C45-B13A-646A3A6244AD}"/>
-                </a:ext>
-              </a:extLst>
-            </p:cNvPr>
-            <p:cNvSpPr txBox="1"/>
-            <p:nvPr/>
-          </p:nvSpPr>
-          <p:spPr>
-            <a:xfrm>
-              <a:off x="2422182" y="2773278"/>
-              <a:ext cx="7918450" cy="307777"/>
-            </a:xfrm>
-            <a:prstGeom prst="rect">
-              <a:avLst/>
-            </a:prstGeom>
-            <a:noFill/>
-            <a:scene3d>
-              <a:camera prst="obliqueTopLeft"/>
-              <a:lightRig rig="threePt" dir="t"/>
-            </a:scene3d>
-          </p:spPr>
-          <p:txBody>
-            <a:bodyPr>
-              <a:spAutoFit/>
-            </a:bodyPr>
-            <a:lstStyle>
-              <a:defPPr>
-                <a:defRPr lang="ko-KR"/>
-              </a:defPPr>
-              <a:lvl1pPr>
-                <a:defRPr sz="2800" spc="-150">
-                  <a:latin typeface="나눔스퀘어 ExtraBold" panose="020B0600000101010101" pitchFamily="50" charset="-127"/>
-                  <a:ea typeface="나눔스퀘어 ExtraBold" panose="020B0600000101010101" pitchFamily="50" charset="-127"/>
-                </a:defRPr>
-              </a:lvl1pPr>
-            </a:lstStyle>
-            <a:p>
-              <a:pPr defTabSz="720000" eaLnBrk="1" hangingPunct="1">
-                <a:defRPr/>
-              </a:pPr>
-              <a:endParaRPr lang="ko-KR" altLang="en-US" sz="1400">
-                <a:latin typeface="맑은 고딕" panose="020B0503020000020004" pitchFamily="50" charset="-127"/>
-                <a:ea typeface="맑은 고딕" panose="020B0503020000020004" pitchFamily="50" charset="-127"/>
-                <a:cs typeface="Arial" panose="020B0604020202020204" pitchFamily="34" charset="0"/>
-              </a:endParaRPr>
-            </a:p>
-          </p:txBody>
-        </p:sp>
-      </p:grpSp>
       <p:grpSp>
         <p:nvGrpSpPr>
           <p:cNvPr id="38" name="그룹 37">

</xml_diff>